<commit_message>
clarify manual merge steps
</commit_message>
<xml_diff>
--- a/Git-GitHub-VS/part-2-slides.pptx
+++ b/Git-GitHub-VS/part-2-slides.pptx
@@ -202,7 +202,7 @@
           <a:p>
             <a:fld id="{B848BF69-DA9F-7D40-A296-20CF312B91FE}" type="datetimeFigureOut">
               <a:rPr lang="en-US" smtClean="0"/>
-              <a:t>9/24/2016</a:t>
+              <a:t>9/27/16</a:t>
             </a:fld>
             <a:endParaRPr lang="en-US"/>
           </a:p>
@@ -721,7 +721,7 @@
           <a:p>
             <a:fld id="{CCBEF86D-3AEA-8547-B737-D50BFDD53D07}" type="datetime1">
               <a:rPr lang="en-US" smtClean="0"/>
-              <a:t>9/24/2016</a:t>
+              <a:t>9/27/16</a:t>
             </a:fld>
             <a:endParaRPr lang="en-US" dirty="0"/>
           </a:p>
@@ -945,7 +945,7 @@
           <a:p>
             <a:fld id="{1B0BAD4A-53FD-C642-A441-F178AC7CC399}" type="datetime1">
               <a:rPr lang="en-US" smtClean="0"/>
-              <a:t>9/24/2016</a:t>
+              <a:t>9/27/16</a:t>
             </a:fld>
             <a:endParaRPr lang="en-US" dirty="0"/>
           </a:p>
@@ -1120,7 +1120,7 @@
           <a:p>
             <a:fld id="{CE9B1B47-6066-CA44-B092-A8E4206DD098}" type="datetime1">
               <a:rPr lang="en-US" smtClean="0"/>
-              <a:t>9/24/2016</a:t>
+              <a:t>9/27/16</a:t>
             </a:fld>
             <a:endParaRPr lang="en-US" dirty="0"/>
           </a:p>
@@ -1285,7 +1285,7 @@
           <a:p>
             <a:fld id="{13626C8A-6A34-CB47-85EE-6AF8FBD80F3C}" type="datetime1">
               <a:rPr lang="en-US" smtClean="0"/>
-              <a:t>9/24/2016</a:t>
+              <a:t>9/27/16</a:t>
             </a:fld>
             <a:endParaRPr lang="en-US" dirty="0"/>
           </a:p>
@@ -1534,7 +1534,7 @@
           <a:p>
             <a:fld id="{05B5923D-1597-B243-AD92-255050F70EDB}" type="datetime1">
               <a:rPr lang="en-US" smtClean="0"/>
-              <a:t>9/24/2016</a:t>
+              <a:t>9/27/16</a:t>
             </a:fld>
             <a:endParaRPr lang="en-US" dirty="0"/>
           </a:p>
@@ -1855,7 +1855,7 @@
           <a:p>
             <a:fld id="{2C158FE9-C886-3447-8CC9-E6F8AB35F569}" type="datetime1">
               <a:rPr lang="en-US" smtClean="0"/>
-              <a:t>9/24/2016</a:t>
+              <a:t>9/27/16</a:t>
             </a:fld>
             <a:endParaRPr lang="en-US" dirty="0"/>
           </a:p>
@@ -2301,7 +2301,7 @@
           <a:p>
             <a:fld id="{20E24BAB-D14B-9F44-9602-24C112C74AD3}" type="datetime1">
               <a:rPr lang="en-US" smtClean="0"/>
-              <a:t>9/24/2016</a:t>
+              <a:t>9/27/16</a:t>
             </a:fld>
             <a:endParaRPr lang="en-US" dirty="0"/>
           </a:p>
@@ -2414,7 +2414,7 @@
           <a:p>
             <a:fld id="{64B699F2-7089-C44F-9A31-8A6069FBA42D}" type="datetime1">
               <a:rPr lang="en-US" smtClean="0"/>
-              <a:t>9/24/2016</a:t>
+              <a:t>9/27/16</a:t>
             </a:fld>
             <a:endParaRPr lang="en-US" dirty="0"/>
           </a:p>
@@ -2504,7 +2504,7 @@
           <a:p>
             <a:fld id="{08AB5F39-5A67-F541-8C6F-AA1BA3DE3231}" type="datetime1">
               <a:rPr lang="en-US" smtClean="0"/>
-              <a:t>9/24/2016</a:t>
+              <a:t>9/27/16</a:t>
             </a:fld>
             <a:endParaRPr lang="en-US" dirty="0"/>
           </a:p>
@@ -2786,7 +2786,7 @@
           <a:p>
             <a:fld id="{203B971B-7C68-0849-A2F4-FBA51ADC365B}" type="datetime1">
               <a:rPr lang="en-US" smtClean="0"/>
-              <a:t>9/24/2016</a:t>
+              <a:t>9/27/16</a:t>
             </a:fld>
             <a:endParaRPr lang="en-US" dirty="0"/>
           </a:p>
@@ -3106,7 +3106,7 @@
           <a:p>
             <a:fld id="{337B7AFA-1BC0-ED43-9B00-914F94A16C24}" type="datetime1">
               <a:rPr lang="en-US" smtClean="0"/>
-              <a:t>9/24/2016</a:t>
+              <a:t>9/27/16</a:t>
             </a:fld>
             <a:endParaRPr lang="en-US" dirty="0"/>
           </a:p>
@@ -3355,7 +3355,7 @@
           <a:p>
             <a:fld id="{A6CFDF78-7429-CD40-82FF-D2D555647D97}" type="datetime1">
               <a:rPr lang="en-US" smtClean="0"/>
-              <a:t>9/24/2016</a:t>
+              <a:t>9/27/16</a:t>
             </a:fld>
             <a:endParaRPr lang="en-US" dirty="0"/>
           </a:p>
@@ -3983,13 +3983,7 @@
               <a:rPr lang="en-US" sz="2800" i="1">
                 <a:hlinkClick r:id="rId2"/>
               </a:rPr>
-              <a:t>https://</a:t>
-            </a:r>
-            <a:r>
-              <a:rPr lang="en-US" sz="2800" i="1">
-                <a:hlinkClick r:id="rId2"/>
-              </a:rPr>
-              <a:t>desktop.github.com/</a:t>
+              <a:t>https://desktop.github.com/</a:t>
             </a:r>
             <a:endParaRPr lang="en-US" sz="2800" i="1"/>
           </a:p>
@@ -4184,7 +4178,7 @@
         <p:spPr/>
         <p:txBody>
           <a:bodyPr anchor="ctr">
-            <a:normAutofit lnSpcReduction="10000"/>
+            <a:normAutofit/>
           </a:bodyPr>
           <a:lstStyle/>
           <a:p>
@@ -4202,18 +4196,29 @@
           <a:p>
             <a:r>
               <a:rPr lang="en-US" sz="3200" dirty="0"/>
-              <a:t>We can import the project from GitHub into IntelliJ</a:t>
-            </a:r>
-          </a:p>
-          <a:p>
-            <a:r>
-              <a:rPr lang="en-US" sz="3200" dirty="0" err="1"/>
-              <a:t>gitignore</a:t>
+              <a:t>We can </a:t>
+            </a:r>
+            <a:r>
+              <a:rPr lang="en-US" sz="3200" dirty="0" smtClean="0"/>
+              <a:t>clone </a:t>
             </a:r>
             <a:r>
               <a:rPr lang="en-US" sz="3200" dirty="0"/>
-              <a:t> used to ignore certain files</a:t>
-            </a:r>
+              <a:t>the </a:t>
+            </a:r>
+            <a:r>
+              <a:rPr lang="en-US" sz="3200" dirty="0" smtClean="0"/>
+              <a:t>fork from </a:t>
+            </a:r>
+            <a:r>
+              <a:rPr lang="en-US" sz="3200" dirty="0"/>
+              <a:t>GitHub into </a:t>
+            </a:r>
+            <a:r>
+              <a:rPr lang="en-US" sz="3200" dirty="0" smtClean="0"/>
+              <a:t>Visual Studio</a:t>
+            </a:r>
+            <a:endParaRPr lang="en-US" sz="3200" dirty="0"/>
           </a:p>
         </p:txBody>
       </p:sp>

</xml_diff>